<commit_message>
upload of lecture 6 and project details
</commit_message>
<xml_diff>
--- a/Chapter 2 - Software Processes.pptx
+++ b/Chapter 2 - Software Processes.pptx
@@ -296,7 +296,7 @@
             <a:fld id="{F2083BB4-0A16-5245-9E06-FF8135372772}" type="datetimeFigureOut">
               <a:rPr lang="en-US" smtClean="0"/>
               <a:pPr/>
-              <a:t>9/19/2018</a:t>
+              <a:t>10/22/2018</a:t>
             </a:fld>
             <a:endParaRPr lang="en-US"/>
           </a:p>
@@ -459,7 +459,7 @@
             <a:fld id="{2BF69228-E2B9-114B-84AC-2DD0140A52E6}" type="datetimeFigureOut">
               <a:rPr lang="en-US" smtClean="0"/>
               <a:pPr/>
-              <a:t>9/19/2018</a:t>
+              <a:t>10/22/2018</a:t>
             </a:fld>
             <a:endParaRPr lang="en-US"/>
           </a:p>
@@ -1652,7 +1652,7 @@
               <a:pPr>
                 <a:defRPr/>
               </a:pPr>
-              <a:t>9/19/2018</a:t>
+              <a:t>10/22/2018</a:t>
             </a:fld>
             <a:endParaRPr lang="en-US"/>
           </a:p>
@@ -1856,7 +1856,7 @@
               <a:pPr>
                 <a:defRPr/>
               </a:pPr>
-              <a:t>9/19/2018</a:t>
+              <a:t>10/22/2018</a:t>
             </a:fld>
             <a:endParaRPr lang="en-US"/>
           </a:p>
@@ -2065,7 +2065,7 @@
               <a:pPr>
                 <a:defRPr/>
               </a:pPr>
-              <a:t>9/19/2018</a:t>
+              <a:t>10/22/2018</a:t>
             </a:fld>
             <a:endParaRPr lang="en-US"/>
           </a:p>
@@ -2331,7 +2331,7 @@
               <a:pPr>
                 <a:defRPr/>
               </a:pPr>
-              <a:t>9/19/2018</a:t>
+              <a:t>10/22/2018</a:t>
             </a:fld>
             <a:endParaRPr lang="en-US"/>
           </a:p>
@@ -2606,7 +2606,7 @@
               <a:pPr>
                 <a:defRPr/>
               </a:pPr>
-              <a:t>9/19/2018</a:t>
+              <a:t>10/22/2018</a:t>
             </a:fld>
             <a:endParaRPr lang="en-US"/>
           </a:p>
@@ -2926,7 +2926,7 @@
               <a:pPr>
                 <a:defRPr/>
               </a:pPr>
-              <a:t>9/19/2018</a:t>
+              <a:t>10/22/2018</a:t>
             </a:fld>
             <a:endParaRPr lang="en-US"/>
           </a:p>
@@ -3386,7 +3386,7 @@
               <a:pPr>
                 <a:defRPr/>
               </a:pPr>
-              <a:t>9/19/2018</a:t>
+              <a:t>10/22/2018</a:t>
             </a:fld>
             <a:endParaRPr lang="en-US"/>
           </a:p>
@@ -3530,7 +3530,7 @@
               <a:pPr>
                 <a:defRPr/>
               </a:pPr>
-              <a:t>9/19/2018</a:t>
+              <a:t>10/22/2018</a:t>
             </a:fld>
             <a:endParaRPr lang="en-US"/>
           </a:p>
@@ -3651,7 +3651,7 @@
               <a:pPr>
                 <a:defRPr/>
               </a:pPr>
-              <a:t>9/19/2018</a:t>
+              <a:t>10/22/2018</a:t>
             </a:fld>
             <a:endParaRPr lang="en-US"/>
           </a:p>
@@ -3960,7 +3960,7 @@
               <a:pPr>
                 <a:defRPr/>
               </a:pPr>
-              <a:t>9/19/2018</a:t>
+              <a:t>10/22/2018</a:t>
             </a:fld>
             <a:endParaRPr lang="en-US"/>
           </a:p>
@@ -4250,7 +4250,7 @@
               <a:pPr>
                 <a:defRPr/>
               </a:pPr>
-              <a:t>9/19/2018</a:t>
+              <a:t>10/22/2018</a:t>
             </a:fld>
             <a:endParaRPr lang="en-US"/>
           </a:p>
@@ -4442,7 +4442,7 @@
               <a:pPr>
                 <a:defRPr/>
               </a:pPr>
-              <a:t>9/19/2018</a:t>
+              <a:t>10/22/2018</a:t>
             </a:fld>
             <a:endParaRPr lang="en-US"/>
           </a:p>
@@ -5232,7 +5232,7 @@
           <p:nvPr/>
         </p:nvPicPr>
         <mc:AlternateContent xmlns:mc="http://schemas.openxmlformats.org/markup-compatibility/2006">
-          <mc:Choice xmlns="" xmlns:mv="urn:schemas-microsoft-com:mac:vml" xmlns:ma="http://schemas.microsoft.com/office/mac/drawingml/2008/main" Requires="ma">
+          <mc:Choice xmlns:ma="http://schemas.microsoft.com/office/mac/drawingml/2008/main" xmlns:mv="urn:schemas-microsoft-com:mac:vml" xmlns="" Requires="ma">
             <p:blipFill>
               <a:blip r:embed="rId2"/>
               <a:stretch>
@@ -5887,7 +5887,7 @@
           <p:nvPr/>
         </p:nvPicPr>
         <mc:AlternateContent xmlns:mc="http://schemas.openxmlformats.org/markup-compatibility/2006">
-          <mc:Choice xmlns="" xmlns:mv="urn:schemas-microsoft-com:mac:vml" xmlns:ma="http://schemas.microsoft.com/office/mac/drawingml/2008/main" Requires="ma">
+          <mc:Choice xmlns:ma="http://schemas.microsoft.com/office/mac/drawingml/2008/main" xmlns:mv="urn:schemas-microsoft-com:mac:vml" xmlns="" Requires="ma">
             <p:blipFill>
               <a:blip r:embed="rId2"/>
               <a:stretch>
@@ -6525,7 +6525,7 @@
           <p:nvPr/>
         </p:nvPicPr>
         <mc:AlternateContent xmlns:mc="http://schemas.openxmlformats.org/markup-compatibility/2006">
-          <mc:Choice xmlns="" xmlns:mv="urn:schemas-microsoft-com:mac:vml" xmlns:ma="http://schemas.microsoft.com/office/mac/drawingml/2008/main" Requires="ma">
+          <mc:Choice xmlns:ma="http://schemas.microsoft.com/office/mac/drawingml/2008/main" xmlns:mv="urn:schemas-microsoft-com:mac:vml" xmlns="" Requires="ma">
             <p:blipFill>
               <a:blip r:embed="rId2"/>
               <a:stretch>
@@ -7039,7 +7039,7 @@
           <p:nvPr/>
         </p:nvPicPr>
         <mc:AlternateContent xmlns:mc="http://schemas.openxmlformats.org/markup-compatibility/2006">
-          <mc:Choice xmlns="" xmlns:mv="urn:schemas-microsoft-com:mac:vml" xmlns:ma="http://schemas.microsoft.com/office/mac/drawingml/2008/main" Requires="ma">
+          <mc:Choice xmlns:ma="http://schemas.microsoft.com/office/mac/drawingml/2008/main" xmlns:mv="urn:schemas-microsoft-com:mac:vml" xmlns="" Requires="ma">
             <p:blipFill>
               <a:blip r:embed="rId2"/>
               <a:stretch>
@@ -7518,7 +7518,7 @@
           <p:nvPr/>
         </p:nvPicPr>
         <mc:AlternateContent xmlns:mc="http://schemas.openxmlformats.org/markup-compatibility/2006">
-          <mc:Choice xmlns="" xmlns:mv="urn:schemas-microsoft-com:mac:vml" xmlns:ma="http://schemas.microsoft.com/office/mac/drawingml/2008/main" Requires="ma">
+          <mc:Choice xmlns:ma="http://schemas.microsoft.com/office/mac/drawingml/2008/main" xmlns:mv="urn:schemas-microsoft-com:mac:vml" xmlns="" Requires="ma">
             <p:blipFill>
               <a:blip r:embed="rId2"/>
               <a:stretch>
@@ -7857,7 +7857,7 @@
           <p:nvPr/>
         </p:nvPicPr>
         <mc:AlternateContent xmlns:mc="http://schemas.openxmlformats.org/markup-compatibility/2006">
-          <mc:Choice xmlns="" xmlns:mv="urn:schemas-microsoft-com:mac:vml" xmlns:ma="http://schemas.microsoft.com/office/mac/drawingml/2008/main" Requires="ma">
+          <mc:Choice xmlns:ma="http://schemas.microsoft.com/office/mac/drawingml/2008/main" xmlns:mv="urn:schemas-microsoft-com:mac:vml" xmlns="" Requires="ma">
             <p:blipFill>
               <a:blip r:embed="rId2"/>
               <a:stretch>
@@ -8165,7 +8165,7 @@
           <p:nvPr/>
         </p:nvPicPr>
         <mc:AlternateContent xmlns:mc="http://schemas.openxmlformats.org/markup-compatibility/2006">
-          <mc:Choice xmlns="" xmlns:mv="urn:schemas-microsoft-com:mac:vml" xmlns:ma="http://schemas.microsoft.com/office/mac/drawingml/2008/main" Requires="ma">
+          <mc:Choice xmlns:ma="http://schemas.microsoft.com/office/mac/drawingml/2008/main" xmlns:mv="urn:schemas-microsoft-com:mac:vml" xmlns="" Requires="ma">
             <p:blipFill>
               <a:blip r:embed="rId2"/>
               <a:stretch>
@@ -9547,7 +9547,7 @@
           <p:nvPr/>
         </p:nvPicPr>
         <mc:AlternateContent xmlns:mc="http://schemas.openxmlformats.org/markup-compatibility/2006">
-          <mc:Choice xmlns="" xmlns:mv="urn:schemas-microsoft-com:mac:vml" xmlns:ma="http://schemas.microsoft.com/office/mac/drawingml/2008/main" Requires="ma">
+          <mc:Choice xmlns:ma="http://schemas.microsoft.com/office/mac/drawingml/2008/main" xmlns:mv="urn:schemas-microsoft-com:mac:vml" xmlns="" Requires="ma">
             <p:blipFill>
               <a:blip r:embed="rId2"/>
               <a:stretch>
@@ -10492,7 +10492,7 @@
           <p:nvPr/>
         </p:nvPicPr>
         <mc:AlternateContent xmlns:mc="http://schemas.openxmlformats.org/markup-compatibility/2006">
-          <mc:Choice xmlns="" xmlns:mv="urn:schemas-microsoft-com:mac:vml" xmlns:ma="http://schemas.microsoft.com/office/mac/drawingml/2008/main" Requires="ma">
+          <mc:Choice xmlns:ma="http://schemas.microsoft.com/office/mac/drawingml/2008/main" xmlns:mv="urn:schemas-microsoft-com:mac:vml" xmlns="" Requires="ma">
             <p:blipFill>
               <a:blip r:embed="rId2"/>
               <a:stretch>
@@ -11110,7 +11110,7 @@
           <p:nvPr/>
         </p:nvPicPr>
         <mc:AlternateContent xmlns:mc="http://schemas.openxmlformats.org/markup-compatibility/2006">
-          <mc:Choice xmlns="" xmlns:mv="urn:schemas-microsoft-com:mac:vml" xmlns:ma="http://schemas.microsoft.com/office/mac/drawingml/2008/main" Requires="ma">
+          <mc:Choice xmlns:ma="http://schemas.microsoft.com/office/mac/drawingml/2008/main" xmlns:mv="urn:schemas-microsoft-com:mac:vml" xmlns="" Requires="ma">
             <p:blipFill>
               <a:blip r:embed="rId2"/>
               <a:stretch>
@@ -11758,7 +11758,7 @@
           <p:nvPr/>
         </p:nvPicPr>
         <mc:AlternateContent xmlns:mc="http://schemas.openxmlformats.org/markup-compatibility/2006">
-          <mc:Choice xmlns="" xmlns:mv="urn:schemas-microsoft-com:mac:vml" xmlns:ma="http://schemas.microsoft.com/office/mac/drawingml/2008/main" Requires="ma">
+          <mc:Choice xmlns:ma="http://schemas.microsoft.com/office/mac/drawingml/2008/main" xmlns:mv="urn:schemas-microsoft-com:mac:vml" xmlns="" Requires="ma">
             <p:blipFill>
               <a:blip r:embed="rId2"/>
               <a:stretch>
@@ -14012,7 +14012,7 @@
           <p:nvPr/>
         </p:nvPicPr>
         <mc:AlternateContent xmlns:mc="http://schemas.openxmlformats.org/markup-compatibility/2006">
-          <mc:Choice xmlns="" xmlns:mv="urn:schemas-microsoft-com:mac:vml" xmlns:ma="http://schemas.microsoft.com/office/mac/drawingml/2008/main" Requires="ma">
+          <mc:Choice xmlns:ma="http://schemas.microsoft.com/office/mac/drawingml/2008/main" xmlns:mv="urn:schemas-microsoft-com:mac:vml" xmlns="" Requires="ma">
             <p:blipFill>
               <a:blip r:embed="rId2"/>
               <a:stretch>

</xml_diff>